<commit_message>
added some stuff to slides
</commit_message>
<xml_diff>
--- a/results/presentation_draft.pptx
+++ b/results/presentation_draft.pptx
@@ -543,11 +543,11 @@
         </c:dLbls>
         <c:gapWidth val="219"/>
         <c:overlap val="-27"/>
-        <c:axId val="324366496"/>
-        <c:axId val="324368456"/>
+        <c:axId val="-1891409504"/>
+        <c:axId val="-1891410048"/>
       </c:barChart>
       <c:catAx>
-        <c:axId val="324366496"/>
+        <c:axId val="-1891409504"/>
         <c:scaling>
           <c:orientation val="minMax"/>
         </c:scaling>
@@ -590,7 +590,7 @@
             <a:endParaRPr lang="en-US"/>
           </a:p>
         </c:txPr>
-        <c:crossAx val="324368456"/>
+        <c:crossAx val="-1891410048"/>
         <c:crosses val="autoZero"/>
         <c:auto val="1"/>
         <c:lblAlgn val="ctr"/>
@@ -598,7 +598,7 @@
         <c:noMultiLvlLbl val="0"/>
       </c:catAx>
       <c:valAx>
-        <c:axId val="324368456"/>
+        <c:axId val="-1891410048"/>
         <c:scaling>
           <c:orientation val="minMax"/>
         </c:scaling>
@@ -649,7 +649,7 @@
             <a:endParaRPr lang="en-US"/>
           </a:p>
         </c:txPr>
-        <c:crossAx val="324366496"/>
+        <c:crossAx val="-1891409504"/>
         <c:crosses val="autoZero"/>
         <c:crossBetween val="between"/>
       </c:valAx>
@@ -1439,7 +1439,7 @@
           <a:p>
             <a:fld id="{785628BC-F588-477D-AB5D-EAE24F884D36}" type="datetimeFigureOut">
               <a:rPr lang="en-US" smtClean="0"/>
-              <a:t>11/29/2014</a:t>
+              <a:t>11/30/2014</a:t>
             </a:fld>
             <a:endParaRPr lang="en-US"/>
           </a:p>
@@ -1609,7 +1609,7 @@
           <a:p>
             <a:fld id="{785628BC-F588-477D-AB5D-EAE24F884D36}" type="datetimeFigureOut">
               <a:rPr lang="en-US" smtClean="0"/>
-              <a:t>11/29/2014</a:t>
+              <a:t>11/30/2014</a:t>
             </a:fld>
             <a:endParaRPr lang="en-US"/>
           </a:p>
@@ -1832,7 +1832,7 @@
           <a:p>
             <a:fld id="{785628BC-F588-477D-AB5D-EAE24F884D36}" type="datetimeFigureOut">
               <a:rPr lang="en-US" smtClean="0"/>
-              <a:t>11/29/2014</a:t>
+              <a:t>11/30/2014</a:t>
             </a:fld>
             <a:endParaRPr lang="en-US"/>
           </a:p>
@@ -2012,7 +2012,7 @@
           <a:p>
             <a:fld id="{785628BC-F588-477D-AB5D-EAE24F884D36}" type="datetimeFigureOut">
               <a:rPr lang="en-US" smtClean="0"/>
-              <a:t>11/29/2014</a:t>
+              <a:t>11/30/2014</a:t>
             </a:fld>
             <a:endParaRPr lang="en-US"/>
           </a:p>
@@ -2318,7 +2318,7 @@
           <a:p>
             <a:fld id="{785628BC-F588-477D-AB5D-EAE24F884D36}" type="datetimeFigureOut">
               <a:rPr lang="en-US" smtClean="0"/>
-              <a:t>11/29/2014</a:t>
+              <a:t>11/30/2014</a:t>
             </a:fld>
             <a:endParaRPr lang="en-US"/>
           </a:p>
@@ -2622,7 +2622,7 @@
           <a:p>
             <a:fld id="{785628BC-F588-477D-AB5D-EAE24F884D36}" type="datetimeFigureOut">
               <a:rPr lang="en-US" smtClean="0"/>
-              <a:t>11/29/2014</a:t>
+              <a:t>11/30/2014</a:t>
             </a:fld>
             <a:endParaRPr lang="en-US"/>
           </a:p>
@@ -3044,7 +3044,7 @@
           <a:p>
             <a:fld id="{785628BC-F588-477D-AB5D-EAE24F884D36}" type="datetimeFigureOut">
               <a:rPr lang="en-US" smtClean="0"/>
-              <a:t>11/29/2014</a:t>
+              <a:t>11/30/2014</a:t>
             </a:fld>
             <a:endParaRPr lang="en-US"/>
           </a:p>
@@ -3162,7 +3162,7 @@
           <a:p>
             <a:fld id="{785628BC-F588-477D-AB5D-EAE24F884D36}" type="datetimeFigureOut">
               <a:rPr lang="en-US" smtClean="0"/>
-              <a:t>11/29/2014</a:t>
+              <a:t>11/30/2014</a:t>
             </a:fld>
             <a:endParaRPr lang="en-US"/>
           </a:p>
@@ -3257,7 +3257,7 @@
           <a:p>
             <a:fld id="{785628BC-F588-477D-AB5D-EAE24F884D36}" type="datetimeFigureOut">
               <a:rPr lang="en-US" smtClean="0"/>
-              <a:t>11/29/2014</a:t>
+              <a:t>11/30/2014</a:t>
             </a:fld>
             <a:endParaRPr lang="en-US"/>
           </a:p>
@@ -3530,7 +3530,7 @@
           <a:p>
             <a:fld id="{785628BC-F588-477D-AB5D-EAE24F884D36}" type="datetimeFigureOut">
               <a:rPr lang="en-US" smtClean="0"/>
-              <a:t>11/29/2014</a:t>
+              <a:t>11/30/2014</a:t>
             </a:fld>
             <a:endParaRPr lang="en-US"/>
           </a:p>
@@ -3795,7 +3795,7 @@
           <a:p>
             <a:fld id="{785628BC-F588-477D-AB5D-EAE24F884D36}" type="datetimeFigureOut">
               <a:rPr lang="en-US" smtClean="0"/>
-              <a:t>11/29/2014</a:t>
+              <a:t>11/30/2014</a:t>
             </a:fld>
             <a:endParaRPr lang="en-US"/>
           </a:p>
@@ -4044,7 +4044,7 @@
           <a:p>
             <a:fld id="{785628BC-F588-477D-AB5D-EAE24F884D36}" type="datetimeFigureOut">
               <a:rPr lang="en-US" smtClean="0"/>
-              <a:t>11/29/2014</a:t>
+              <a:t>11/30/2014</a:t>
             </a:fld>
             <a:endParaRPr lang="en-US"/>
           </a:p>
@@ -4781,54 +4781,192 @@
           </a:p>
         </p:txBody>
       </p:sp>
-      <p:sp>
-        <p:nvSpPr>
-          <p:cNvPr id="3" name="Content Placeholder 2"/>
-          <p:cNvSpPr>
-            <a:spLocks noGrp="1"/>
-          </p:cNvSpPr>
-          <p:nvPr>
-            <p:ph idx="1"/>
-          </p:nvPr>
-        </p:nvSpPr>
-        <p:spPr/>
-        <p:txBody>
-          <a:bodyPr/>
-          <a:lstStyle/>
-          <a:p>
-            <a:r>
-              <a:rPr lang="en-US" dirty="0" smtClean="0"/>
-              <a:t>The hash doesn’t run directly on the image, it runs on the frequency representation of the image.</a:t>
-            </a:r>
-          </a:p>
-          <a:p>
-            <a:endParaRPr lang="en-US" dirty="0"/>
-          </a:p>
-          <a:p>
-            <a:r>
-              <a:rPr lang="en-US" dirty="0" smtClean="0"/>
-              <a:t>To compute the </a:t>
-            </a:r>
-            <a:r>
-              <a:rPr lang="en-US" dirty="0"/>
-              <a:t>F</a:t>
-            </a:r>
-            <a:r>
-              <a:rPr lang="en-US" dirty="0" smtClean="0"/>
-              <a:t>ourier transform of the image, we implemented a 2D Fast Fourier Transform on GPU using the </a:t>
-            </a:r>
-            <a:r>
-              <a:rPr lang="en-US" dirty="0" err="1" smtClean="0"/>
-              <a:t>OpenCL</a:t>
-            </a:r>
-            <a:r>
-              <a:rPr lang="en-US" dirty="0" smtClean="0"/>
-              <a:t> API for all-purpose computing on GPUs.</a:t>
-            </a:r>
-            <a:endParaRPr lang="en-US" dirty="0"/>
-          </a:p>
-        </p:txBody>
-      </p:sp>
+      <mc:AlternateContent xmlns:mc="http://schemas.openxmlformats.org/markup-compatibility/2006">
+        <mc:Choice xmlns:a14="http://schemas.microsoft.com/office/drawing/2010/main" Requires="a14">
+          <p:sp>
+            <p:nvSpPr>
+              <p:cNvPr id="3" name="Content Placeholder 2"/>
+              <p:cNvSpPr>
+                <a:spLocks noGrp="1"/>
+              </p:cNvSpPr>
+              <p:nvPr>
+                <p:ph idx="1"/>
+              </p:nvPr>
+            </p:nvSpPr>
+            <p:spPr/>
+            <p:txBody>
+              <a:bodyPr/>
+              <a:lstStyle/>
+              <a:p>
+                <a:r>
+                  <a:rPr lang="en-US" dirty="0" smtClean="0"/>
+                  <a:t>The hash doesn’t run directly on the image, it runs on the frequency representation of the image.</a:t>
+                </a:r>
+              </a:p>
+              <a:p>
+                <a:endParaRPr lang="en-US" dirty="0"/>
+              </a:p>
+              <a:p>
+                <a:r>
+                  <a:rPr lang="en-US" dirty="0" smtClean="0"/>
+                  <a:t>To compute the </a:t>
+                </a:r>
+                <a:r>
+                  <a:rPr lang="en-US" dirty="0"/>
+                  <a:t>F</a:t>
+                </a:r>
+                <a:r>
+                  <a:rPr lang="en-US" dirty="0" smtClean="0"/>
+                  <a:t>ourier transform of the image, we implemented a 2D Fast Fourier Transform on GPU using the </a:t>
+                </a:r>
+                <a:r>
+                  <a:rPr lang="en-US" dirty="0" err="1" smtClean="0"/>
+                  <a:t>OpenCL</a:t>
+                </a:r>
+                <a:r>
+                  <a:rPr lang="en-US" dirty="0" smtClean="0"/>
+                  <a:t> API for all-purpose computing on GPUs</a:t>
+                </a:r>
+                <a:r>
+                  <a:rPr lang="en-US" dirty="0" smtClean="0"/>
+                  <a:t>.</a:t>
+                </a:r>
+              </a:p>
+              <a:p>
+                <a:endParaRPr lang="en-US" dirty="0"/>
+              </a:p>
+              <a:p>
+                <a:r>
+                  <a:rPr lang="en-US" dirty="0" smtClean="0"/>
+                  <a:t>We used the Cooley-</a:t>
+                </a:r>
+                <a:r>
+                  <a:rPr lang="en-US" dirty="0" err="1" smtClean="0"/>
+                  <a:t>Tukey</a:t>
+                </a:r>
+                <a:r>
+                  <a:rPr lang="en-US" dirty="0" smtClean="0"/>
+                  <a:t> implementation of FFT, which has complexity </a:t>
+                </a:r>
+                <a14:m>
+                  <m:oMath xmlns:m="http://schemas.openxmlformats.org/officeDocument/2006/math">
+                    <m:sSup>
+                      <m:sSupPr>
+                        <m:ctrlPr>
+                          <a:rPr lang="en-US" b="0" i="1" smtClean="0">
+                            <a:latin typeface="Cambria Math" panose="02040503050406030204" pitchFamily="18" charset="0"/>
+                          </a:rPr>
+                        </m:ctrlPr>
+                      </m:sSupPr>
+                      <m:e>
+                        <m:r>
+                          <a:rPr lang="en-US" b="0" i="1" smtClean="0">
+                            <a:latin typeface="Cambria Math" panose="02040503050406030204" pitchFamily="18" charset="0"/>
+                          </a:rPr>
+                          <m:t>𝑁</m:t>
+                        </m:r>
+                      </m:e>
+                      <m:sup>
+                        <m:r>
+                          <a:rPr lang="en-US" b="0" i="1" smtClean="0">
+                            <a:latin typeface="Cambria Math" panose="02040503050406030204" pitchFamily="18" charset="0"/>
+                          </a:rPr>
+                          <m:t>2</m:t>
+                        </m:r>
+                      </m:sup>
+                    </m:sSup>
+                    <m:func>
+                      <m:funcPr>
+                        <m:ctrlPr>
+                          <a:rPr lang="en-US" b="0" i="1" smtClean="0">
+                            <a:latin typeface="Cambria Math" panose="02040503050406030204" pitchFamily="18" charset="0"/>
+                          </a:rPr>
+                        </m:ctrlPr>
+                      </m:funcPr>
+                      <m:fName>
+                        <m:sSub>
+                          <m:sSubPr>
+                            <m:ctrlPr>
+                              <a:rPr lang="en-US" b="0" i="1" smtClean="0">
+                                <a:latin typeface="Cambria Math" panose="02040503050406030204" pitchFamily="18" charset="0"/>
+                              </a:rPr>
+                            </m:ctrlPr>
+                          </m:sSubPr>
+                          <m:e>
+                            <m:r>
+                              <m:rPr>
+                                <m:sty m:val="p"/>
+                              </m:rPr>
+                              <a:rPr lang="en-US" b="0" i="0" smtClean="0">
+                                <a:latin typeface="Cambria Math" panose="02040503050406030204" pitchFamily="18" charset="0"/>
+                              </a:rPr>
+                              <m:t>log</m:t>
+                            </m:r>
+                          </m:e>
+                          <m:sub>
+                            <m:r>
+                              <a:rPr lang="en-US" b="0" i="1" smtClean="0">
+                                <a:latin typeface="Cambria Math" panose="02040503050406030204" pitchFamily="18" charset="0"/>
+                              </a:rPr>
+                              <m:t>2</m:t>
+                            </m:r>
+                          </m:sub>
+                        </m:sSub>
+                      </m:fName>
+                      <m:e>
+                        <m:r>
+                          <a:rPr lang="en-US" b="0" i="1" smtClean="0">
+                            <a:latin typeface="Cambria Math" panose="02040503050406030204" pitchFamily="18" charset="0"/>
+                          </a:rPr>
+                          <m:t>𝑁</m:t>
+                        </m:r>
+                      </m:e>
+                    </m:func>
+                  </m:oMath>
+                </a14:m>
+                <a:r>
+                  <a:rPr lang="en-US" dirty="0" smtClean="0"/>
+                  <a:t> for the 2D implementation.</a:t>
+                </a:r>
+                <a:endParaRPr lang="en-US" dirty="0"/>
+              </a:p>
+            </p:txBody>
+          </p:sp>
+        </mc:Choice>
+        <mc:Fallback>
+          <p:sp>
+            <p:nvSpPr>
+              <p:cNvPr id="3" name="Content Placeholder 2"/>
+              <p:cNvSpPr>
+                <a:spLocks noGrp="1" noRot="1" noChangeAspect="1" noMove="1" noResize="1" noEditPoints="1" noAdjustHandles="1" noChangeArrowheads="1" noChangeShapeType="1" noTextEdit="1"/>
+              </p:cNvSpPr>
+              <p:nvPr>
+                <p:ph idx="1"/>
+              </p:nvPr>
+            </p:nvSpPr>
+            <p:spPr>
+              <a:blipFill rotWithShape="0">
+                <a:blip r:embed="rId2"/>
+                <a:stretch>
+                  <a:fillRect l="-685" t="-1884"/>
+                </a:stretch>
+              </a:blipFill>
+            </p:spPr>
+            <p:txBody>
+              <a:bodyPr/>
+              <a:lstStyle/>
+              <a:p>
+                <a:r>
+                  <a:rPr lang="en-US">
+                    <a:noFill/>
+                  </a:rPr>
+                  <a:t> </a:t>
+                </a:r>
+              </a:p>
+            </p:txBody>
+          </p:sp>
+        </mc:Fallback>
+      </mc:AlternateContent>
     </p:spTree>
     <p:extLst>
       <p:ext uri="{BB962C8B-B14F-4D97-AF65-F5344CB8AC3E}">
@@ -4988,34 +5126,100 @@
           <a:p>
             <a:r>
               <a:rPr lang="en-US" dirty="0" smtClean="0"/>
-              <a:t>Once the frequency domain is computed using FFT, the hashing algorithm is run.</a:t>
-            </a:r>
-          </a:p>
-          <a:p>
+              <a:t>Once the frequency domain is computed using FFT, the hashing algorithm is </a:t>
+            </a:r>
+            <a:r>
+              <a:rPr lang="en-US" dirty="0" smtClean="0"/>
+              <a:t>performed on the resulting matrix.</a:t>
+            </a:r>
             <a:endParaRPr lang="en-US" dirty="0" smtClean="0"/>
           </a:p>
           <a:p>
             <a:r>
               <a:rPr lang="en-US" dirty="0" smtClean="0"/>
-              <a:t>Gives bigger importance to lower frequency components since they contain a large amount of information from the image.</a:t>
-            </a:r>
-          </a:p>
-          <a:p>
+              <a:t>Gives bigger importance to lower frequency components since they contain </a:t>
+            </a:r>
+            <a:r>
+              <a:rPr lang="en-US" dirty="0" smtClean="0"/>
+              <a:t>a large </a:t>
+            </a:r>
+            <a:r>
+              <a:rPr lang="en-US" dirty="0" smtClean="0"/>
+              <a:t>amount of information from the image</a:t>
+            </a:r>
+            <a:r>
+              <a:rPr lang="en-US" dirty="0" smtClean="0"/>
+              <a:t>.</a:t>
+            </a:r>
             <a:endParaRPr lang="en-US" dirty="0" smtClean="0"/>
           </a:p>
           <a:p>
             <a:r>
               <a:rPr lang="en-US" dirty="0" smtClean="0"/>
-              <a:t>Those are mostly stable by image manipulation</a:t>
-            </a:r>
-            <a:r>
-              <a:rPr lang="en-US" dirty="0"/>
-              <a:t>.</a:t>
+              <a:t>These components will stay stable if image changes slightly. This is not usually the case for spatial domain.</a:t>
             </a:r>
             <a:endParaRPr lang="en-US" dirty="0" smtClean="0"/>
           </a:p>
         </p:txBody>
       </p:sp>
+      <p:pic>
+        <p:nvPicPr>
+          <p:cNvPr id="4" name="Picture 3"/>
+          <p:cNvPicPr>
+            <a:picLocks noChangeAspect="1"/>
+          </p:cNvPicPr>
+          <p:nvPr/>
+        </p:nvPicPr>
+        <p:blipFill rotWithShape="1">
+          <a:blip r:embed="rId2" cstate="print">
+            <a:extLst>
+              <a:ext uri="{28A0092B-C50C-407E-A947-70E740481C1C}">
+                <a14:useLocalDpi xmlns:a14="http://schemas.microsoft.com/office/drawing/2010/main" val="0"/>
+              </a:ext>
+            </a:extLst>
+          </a:blip>
+          <a:srcRect t="8617"/>
+          <a:stretch/>
+        </p:blipFill>
+        <p:spPr>
+          <a:xfrm>
+            <a:off x="1353840" y="4643020"/>
+            <a:ext cx="4349883" cy="1793643"/>
+          </a:xfrm>
+          <a:prstGeom prst="rect">
+            <a:avLst/>
+          </a:prstGeom>
+        </p:spPr>
+      </p:pic>
+      <p:pic>
+        <p:nvPicPr>
+          <p:cNvPr id="6" name="Picture 5"/>
+          <p:cNvPicPr>
+            <a:picLocks noChangeAspect="1"/>
+          </p:cNvPicPr>
+          <p:nvPr/>
+        </p:nvPicPr>
+        <p:blipFill rotWithShape="1">
+          <a:blip r:embed="rId3" cstate="print">
+            <a:extLst>
+              <a:ext uri="{28A0092B-C50C-407E-A947-70E740481C1C}">
+                <a14:useLocalDpi xmlns:a14="http://schemas.microsoft.com/office/drawing/2010/main" val="0"/>
+              </a:ext>
+            </a:extLst>
+          </a:blip>
+          <a:srcRect t="10289" b="4477"/>
+          <a:stretch/>
+        </p:blipFill>
+        <p:spPr>
+          <a:xfrm>
+            <a:off x="6578353" y="4643021"/>
+            <a:ext cx="4181854" cy="1748902"/>
+          </a:xfrm>
+          <a:prstGeom prst="rect">
+            <a:avLst/>
+          </a:prstGeom>
+        </p:spPr>
+      </p:pic>
     </p:spTree>
     <p:extLst>
       <p:ext uri="{BB962C8B-B14F-4D97-AF65-F5344CB8AC3E}">
@@ -5122,25 +5326,8 @@
           <a:p>
             <a:r>
               <a:rPr lang="en-US" dirty="0" smtClean="0"/>
-              <a:t>Hypothesis</a:t>
-            </a:r>
-            <a:r>
-              <a:rPr lang="en-US" dirty="0" smtClean="0"/>
-              <a:t>: by associating lower frequencies with </a:t>
-            </a:r>
-            <a:r>
-              <a:rPr lang="en-US" dirty="0" smtClean="0"/>
-              <a:t>larger prime </a:t>
-            </a:r>
-            <a:r>
-              <a:rPr lang="en-US" dirty="0" smtClean="0"/>
-              <a:t>numbers, we are going to get hashes closer to each other for similar </a:t>
-            </a:r>
-            <a:r>
-              <a:rPr lang="en-US" dirty="0" smtClean="0"/>
-              <a:t>images.</a:t>
-            </a:r>
-            <a:endParaRPr lang="en-US" dirty="0" smtClean="0"/>
+              <a:t>Hypothesis: by associating lower frequencies with larger prime numbers, we are going to get hashes closer to each other for similar images.</a:t>
+            </a:r>
           </a:p>
           <a:p>
             <a:endParaRPr lang="en-US" dirty="0"/>
@@ -5871,11 +6058,7 @@
           <a:p>
             <a:r>
               <a:rPr lang="en-US" dirty="0" smtClean="0"/>
-              <a:t>Results – Hashing – </a:t>
-            </a:r>
-            <a:r>
-              <a:rPr lang="en-US" dirty="0" smtClean="0"/>
-              <a:t>I7 Processor</a:t>
+              <a:t>Results – Hashing – I7 Processor</a:t>
             </a:r>
             <a:endParaRPr lang="en-US" dirty="0"/>
           </a:p>
@@ -5983,35 +6166,7 @@
           <a:p>
             <a:r>
               <a:rPr lang="en-US" dirty="0" smtClean="0"/>
-              <a:t>The initial idea was to implement the </a:t>
-            </a:r>
-            <a:r>
-              <a:rPr lang="en-US" dirty="0" smtClean="0"/>
-              <a:t>Fisher faces algorithm for </a:t>
-            </a:r>
-            <a:r>
-              <a:rPr lang="en-US" dirty="0" smtClean="0"/>
-              <a:t>facial recognition </a:t>
-            </a:r>
-            <a:r>
-              <a:rPr lang="en-US" dirty="0" smtClean="0"/>
-              <a:t>but </a:t>
-            </a:r>
-            <a:r>
-              <a:rPr lang="en-US" dirty="0" smtClean="0"/>
-              <a:t>due to the time </a:t>
-            </a:r>
-            <a:r>
-              <a:rPr lang="en-US" dirty="0" smtClean="0"/>
-              <a:t>constraints </a:t>
-            </a:r>
-            <a:r>
-              <a:rPr lang="en-US" dirty="0" smtClean="0"/>
-              <a:t>we had to simplify our goals</a:t>
-            </a:r>
-            <a:r>
-              <a:rPr lang="en-US" dirty="0" smtClean="0"/>
-              <a:t>.</a:t>
+              <a:t>The initial idea was to implement the Fisher faces algorithm for facial recognition but due to the time constraints we had to simplify our goals.</a:t>
             </a:r>
           </a:p>
           <a:p>
@@ -6037,11 +6192,23 @@
             </a:r>
             <a:r>
               <a:rPr lang="en-US" dirty="0" smtClean="0"/>
-              <a:t> to parallelize </a:t>
+              <a:t> to parallelize the hashing part is not worth </a:t>
             </a:r>
             <a:r>
               <a:rPr lang="en-US" dirty="0" smtClean="0"/>
-              <a:t>the hashing part is not worth it since the runtime is similar to serial</a:t>
+              <a:t>it </a:t>
+            </a:r>
+            <a:r>
+              <a:rPr lang="en-US" dirty="0" smtClean="0"/>
+              <a:t>since </a:t>
+            </a:r>
+            <a:r>
+              <a:rPr lang="en-US" dirty="0" smtClean="0"/>
+              <a:t>the </a:t>
+            </a:r>
+            <a:r>
+              <a:rPr lang="en-US" dirty="0" smtClean="0"/>
+              <a:t>parallelized computations are very simple (multiplication) and the communication overhead is too large.</a:t>
             </a:r>
             <a:endParaRPr lang="en-US" dirty="0" smtClean="0"/>
           </a:p>

</xml_diff>

<commit_message>
add slide for serial alg
</commit_message>
<xml_diff>
--- a/results/presentation_draft.pptx
+++ b/results/presentation_draft.pptx
@@ -8,12 +8,13 @@
     <p:sldId id="256" r:id="rId2"/>
     <p:sldId id="257" r:id="rId3"/>
     <p:sldId id="259" r:id="rId4"/>
-    <p:sldId id="264" r:id="rId5"/>
-    <p:sldId id="260" r:id="rId6"/>
-    <p:sldId id="263" r:id="rId7"/>
-    <p:sldId id="258" r:id="rId8"/>
-    <p:sldId id="261" r:id="rId9"/>
-    <p:sldId id="262" r:id="rId10"/>
+    <p:sldId id="265" r:id="rId5"/>
+    <p:sldId id="264" r:id="rId6"/>
+    <p:sldId id="260" r:id="rId7"/>
+    <p:sldId id="263" r:id="rId8"/>
+    <p:sldId id="258" r:id="rId9"/>
+    <p:sldId id="261" r:id="rId10"/>
+    <p:sldId id="262" r:id="rId11"/>
   </p:sldIdLst>
   <p:sldSz cx="12192000" cy="6858000"/>
   <p:notesSz cx="6858000" cy="9144000"/>
@@ -219,60 +220,18 @@
               <c:layout/>
               <c:tx>
                 <c:rich>
-                  <a:bodyPr rot="0" spcFirstLastPara="1" vertOverflow="ellipsis" vert="horz" wrap="square" anchor="ctr" anchorCtr="1"/>
+                  <a:bodyPr/>
                   <a:lstStyle/>
                   <a:p>
-                    <a:pPr>
-                      <a:defRPr lang="en-US" sz="1800" b="0" i="0" u="none" strike="noStrike" kern="1200" baseline="0">
-                        <a:solidFill>
-                          <a:schemeClr val="tx1">
-                            <a:lumMod val="75000"/>
-                            <a:lumOff val="25000"/>
-                          </a:schemeClr>
-                        </a:solidFill>
-                        <a:latin typeface="+mn-lt"/>
-                        <a:ea typeface="+mn-ea"/>
-                        <a:cs typeface="+mn-cs"/>
-                      </a:defRPr>
-                    </a:pPr>
                     <a:fld id="{EEC6EAEB-FCA5-42D9-95AA-200DD719383C}" type="VALUE">
                       <a:rPr lang="en-US"/>
-                      <a:pPr>
-                        <a:defRPr/>
-                      </a:pPr>
+                      <a:pPr/>
                       <a:t>[VALUE]</a:t>
                     </a:fld>
                     <a:endParaRPr lang="en-US"/>
                   </a:p>
                 </c:rich>
               </c:tx>
-              <c:spPr>
-                <a:noFill/>
-                <a:ln>
-                  <a:noFill/>
-                </a:ln>
-                <a:effectLst/>
-              </c:spPr>
-              <c:txPr>
-                <a:bodyPr rot="0" spcFirstLastPara="1" vertOverflow="ellipsis" vert="horz" wrap="square" anchor="ctr" anchorCtr="1"/>
-                <a:lstStyle/>
-                <a:p>
-                  <a:pPr>
-                    <a:defRPr lang="en-US" sz="1800" b="0" i="0" u="none" strike="noStrike" kern="1200" baseline="0">
-                      <a:solidFill>
-                        <a:schemeClr val="tx1">
-                          <a:lumMod val="75000"/>
-                          <a:lumOff val="25000"/>
-                        </a:schemeClr>
-                      </a:solidFill>
-                      <a:latin typeface="+mn-lt"/>
-                      <a:ea typeface="+mn-ea"/>
-                      <a:cs typeface="+mn-cs"/>
-                    </a:defRPr>
-                  </a:pPr>
-                  <a:endParaRPr lang="en-US"/>
-                </a:p>
-              </c:txPr>
               <c:dLblPos val="outEnd"/>
               <c:showLegendKey val="0"/>
               <c:showVal val="1"/>
@@ -513,11 +472,11 @@
         </c:dLbls>
         <c:gapWidth val="219"/>
         <c:overlap val="-27"/>
-        <c:axId val="352177624"/>
-        <c:axId val="352173704"/>
+        <c:axId val="-1961258016"/>
+        <c:axId val="-1961252576"/>
       </c:barChart>
       <c:catAx>
-        <c:axId val="352177624"/>
+        <c:axId val="-1961258016"/>
         <c:scaling>
           <c:orientation val="minMax"/>
         </c:scaling>
@@ -560,7 +519,7 @@
             <a:endParaRPr lang="en-US"/>
           </a:p>
         </c:txPr>
-        <c:crossAx val="352173704"/>
+        <c:crossAx val="-1961252576"/>
         <c:crosses val="autoZero"/>
         <c:auto val="1"/>
         <c:lblAlgn val="ctr"/>
@@ -568,7 +527,7 @@
         <c:noMultiLvlLbl val="0"/>
       </c:catAx>
       <c:valAx>
-        <c:axId val="352173704"/>
+        <c:axId val="-1961252576"/>
         <c:scaling>
           <c:orientation val="minMax"/>
         </c:scaling>
@@ -619,7 +578,7 @@
             <a:endParaRPr lang="en-US"/>
           </a:p>
         </c:txPr>
-        <c:crossAx val="352177624"/>
+        <c:crossAx val="-1961258016"/>
         <c:crosses val="autoZero"/>
         <c:crossBetween val="between"/>
       </c:valAx>
@@ -1112,11 +1071,11 @@
         </c:dLbls>
         <c:gapWidth val="219"/>
         <c:overlap val="-27"/>
-        <c:axId val="295163424"/>
-        <c:axId val="295169304"/>
+        <c:axId val="-1961262368"/>
+        <c:axId val="-1961260736"/>
       </c:barChart>
       <c:catAx>
-        <c:axId val="295163424"/>
+        <c:axId val="-1961262368"/>
         <c:scaling>
           <c:orientation val="minMax"/>
         </c:scaling>
@@ -1159,7 +1118,7 @@
             <a:endParaRPr lang="en-US"/>
           </a:p>
         </c:txPr>
-        <c:crossAx val="295169304"/>
+        <c:crossAx val="-1961260736"/>
         <c:crosses val="autoZero"/>
         <c:auto val="1"/>
         <c:lblAlgn val="ctr"/>
@@ -1167,7 +1126,7 @@
         <c:noMultiLvlLbl val="0"/>
       </c:catAx>
       <c:valAx>
-        <c:axId val="295169304"/>
+        <c:axId val="-1961260736"/>
         <c:scaling>
           <c:orientation val="minMax"/>
         </c:scaling>
@@ -1218,7 +1177,7 @@
             <a:endParaRPr lang="en-US"/>
           </a:p>
         </c:txPr>
-        <c:crossAx val="295163424"/>
+        <c:crossAx val="-1961262368"/>
         <c:crosses val="autoZero"/>
         <c:crossBetween val="between"/>
       </c:valAx>
@@ -5685,13 +5644,8 @@
           <a:p>
             <a:r>
               <a:rPr lang="en-US" dirty="0" smtClean="0"/>
-              <a:t>Vincent </a:t>
-            </a:r>
-            <a:r>
-              <a:rPr lang="en-US" dirty="0" smtClean="0"/>
-              <a:t>Petrella</a:t>
-            </a:r>
-            <a:endParaRPr lang="en-US" dirty="0" smtClean="0"/>
+              <a:t>Vincent Petrella</a:t>
+            </a:r>
           </a:p>
           <a:p>
             <a:r>
@@ -5717,6 +5671,114 @@
     <p:extLst>
       <p:ext uri="{BB962C8B-B14F-4D97-AF65-F5344CB8AC3E}">
         <p14:creationId xmlns:p14="http://schemas.microsoft.com/office/powerpoint/2010/main" val="3208140007"/>
+      </p:ext>
+    </p:extLst>
+  </p:cSld>
+  <p:clrMapOvr>
+    <a:masterClrMapping/>
+  </p:clrMapOvr>
+  <p:timing>
+    <p:tnLst>
+      <p:par>
+        <p:cTn id="1" dur="indefinite" restart="never" nodeType="tmRoot"/>
+      </p:par>
+    </p:tnLst>
+  </p:timing>
+</p:sld>
+</file>
+
+<file path=ppt/slides/slide10.xml><?xml version="1.0" encoding="utf-8"?>
+<p:sld xmlns:a="http://schemas.openxmlformats.org/drawingml/2006/main" xmlns:r="http://schemas.openxmlformats.org/officeDocument/2006/relationships" xmlns:p="http://schemas.openxmlformats.org/presentationml/2006/main">
+  <p:cSld>
+    <p:spTree>
+      <p:nvGrpSpPr>
+        <p:cNvPr id="1" name=""/>
+        <p:cNvGrpSpPr/>
+        <p:nvPr/>
+      </p:nvGrpSpPr>
+      <p:grpSpPr>
+        <a:xfrm>
+          <a:off x="0" y="0"/>
+          <a:ext cx="0" cy="0"/>
+          <a:chOff x="0" y="0"/>
+          <a:chExt cx="0" cy="0"/>
+        </a:xfrm>
+      </p:grpSpPr>
+      <p:sp>
+        <p:nvSpPr>
+          <p:cNvPr id="2" name="Title 1"/>
+          <p:cNvSpPr>
+            <a:spLocks noGrp="1"/>
+          </p:cNvSpPr>
+          <p:nvPr>
+            <p:ph type="title"/>
+          </p:nvPr>
+        </p:nvSpPr>
+        <p:spPr/>
+        <p:txBody>
+          <a:bodyPr/>
+          <a:lstStyle/>
+          <a:p>
+            <a:r>
+              <a:rPr lang="en-US" dirty="0" smtClean="0"/>
+              <a:t>conclusion</a:t>
+            </a:r>
+            <a:endParaRPr lang="en-US" dirty="0"/>
+          </a:p>
+        </p:txBody>
+      </p:sp>
+      <p:sp>
+        <p:nvSpPr>
+          <p:cNvPr id="3" name="Content Placeholder 2"/>
+          <p:cNvSpPr>
+            <a:spLocks noGrp="1"/>
+          </p:cNvSpPr>
+          <p:nvPr>
+            <p:ph idx="1"/>
+          </p:nvPr>
+        </p:nvSpPr>
+        <p:spPr/>
+        <p:txBody>
+          <a:bodyPr/>
+          <a:lstStyle/>
+          <a:p>
+            <a:r>
+              <a:rPr lang="en-US" dirty="0" smtClean="0"/>
+              <a:t>An improvement to our algorithm would be to implement the Fisher faces algorithm for facial.</a:t>
+            </a:r>
+          </a:p>
+          <a:p>
+            <a:endParaRPr lang="en-US" dirty="0"/>
+          </a:p>
+          <a:p>
+            <a:r>
+              <a:rPr lang="en-US" dirty="0" smtClean="0"/>
+              <a:t>It’s more performant to parallelize the FFT process</a:t>
+            </a:r>
+          </a:p>
+          <a:p>
+            <a:endParaRPr lang="en-US" dirty="0"/>
+          </a:p>
+          <a:p>
+            <a:r>
+              <a:rPr lang="en-US" dirty="0" smtClean="0"/>
+              <a:t>Using </a:t>
+            </a:r>
+            <a:r>
+              <a:rPr lang="en-US" dirty="0" err="1" smtClean="0"/>
+              <a:t>OpenMP</a:t>
+            </a:r>
+            <a:r>
+              <a:rPr lang="en-US" dirty="0" smtClean="0"/>
+              <a:t> to parallelize the hashing part is not worth it since the parallelized computations are very simple (multiplication) and the communication overhead is too large.</a:t>
+            </a:r>
+          </a:p>
+        </p:txBody>
+      </p:sp>
+    </p:spTree>
+    <p:extLst>
+      <p:ext uri="{BB962C8B-B14F-4D97-AF65-F5344CB8AC3E}">
+        <p14:creationId xmlns:p14="http://schemas.microsoft.com/office/powerpoint/2010/main" val="847783788"/>
       </p:ext>
     </p:extLst>
   </p:cSld>
@@ -5817,11 +5879,7 @@
           <a:p>
             <a:r>
               <a:rPr lang="en-US" dirty="0" smtClean="0"/>
-              <a:t>Focus of the project is to compute the hash efficiently </a:t>
-            </a:r>
-            <a:r>
-              <a:rPr lang="en-US" dirty="0" smtClean="0"/>
-              <a:t>in parallel using </a:t>
+              <a:t>Focus of the project is to compute the hash efficiently in parallel using </a:t>
             </a:r>
             <a:r>
               <a:rPr lang="en-US" dirty="0" err="1" smtClean="0"/>
@@ -5839,7 +5897,6 @@
               <a:rPr lang="en-US" dirty="0" smtClean="0"/>
               <a:t> for the hash computations.</a:t>
             </a:r>
-            <a:endParaRPr lang="en-US" dirty="0" smtClean="0"/>
           </a:p>
           <a:p>
             <a:endParaRPr lang="en-US" dirty="0"/>
@@ -5914,8 +5971,8 @@
           </a:p>
         </p:txBody>
       </p:sp>
-      <mc:AlternateContent xmlns:mc="http://schemas.openxmlformats.org/markup-compatibility/2006">
-        <mc:Choice xmlns:a14="http://schemas.microsoft.com/office/drawing/2010/main" Requires="a14">
+      <mc:AlternateContent xmlns:mc="http://schemas.openxmlformats.org/markup-compatibility/2006" xmlns:a14="http://schemas.microsoft.com/office/drawing/2010/main">
+        <mc:Choice Requires="a14">
           <p:sp>
             <p:nvSpPr>
               <p:cNvPr id="3" name="Content Placeholder 2"/>
@@ -5975,11 +6032,7 @@
                 </a:r>
                 <a:r>
                   <a:rPr lang="en-US" dirty="0" smtClean="0"/>
-                  <a:t> implementation of FFT, which has complexity </a:t>
-                </a:r>
-                <a:r>
-                  <a:rPr lang="en-US" dirty="0" smtClean="0"/>
-                  <a:t>N </a:t>
+                  <a:t> implementation of FFT, which has complexity N </a:t>
                 </a:r>
                 <a14:m>
                   <m:oMath xmlns:m="http://schemas.openxmlformats.org/officeDocument/2006/math">
@@ -6041,7 +6094,7 @@
             </p:txBody>
           </p:sp>
         </mc:Choice>
-        <mc:Fallback>
+        <mc:Fallback xmlns="">
           <p:sp>
             <p:nvSpPr>
               <p:cNvPr id="3" name="Content Placeholder 2"/>
@@ -6128,6 +6181,269 @@
           <a:lstStyle/>
           <a:p>
             <a:r>
+              <a:rPr lang="en-US" dirty="0" smtClean="0"/>
+              <a:t>SERIAL FFT implementation</a:t>
+            </a:r>
+            <a:endParaRPr lang="en-US" dirty="0"/>
+          </a:p>
+        </p:txBody>
+      </p:sp>
+      <mc:AlternateContent xmlns:mc="http://schemas.openxmlformats.org/markup-compatibility/2006">
+        <mc:Choice xmlns:a14="http://schemas.microsoft.com/office/drawing/2010/main" Requires="a14">
+          <p:sp>
+            <p:nvSpPr>
+              <p:cNvPr id="3" name="Content Placeholder 2"/>
+              <p:cNvSpPr>
+                <a:spLocks noGrp="1"/>
+              </p:cNvSpPr>
+              <p:nvPr>
+                <p:ph idx="1"/>
+              </p:nvPr>
+            </p:nvSpPr>
+            <p:spPr>
+              <a:xfrm>
+                <a:off x="1202919" y="2011679"/>
+                <a:ext cx="4757934" cy="4708297"/>
+              </a:xfrm>
+            </p:spPr>
+            <p:txBody>
+              <a:bodyPr>
+                <a:normAutofit lnSpcReduction="10000"/>
+              </a:bodyPr>
+              <a:lstStyle/>
+              <a:p>
+                <a:r>
+                  <a:rPr lang="en-US" dirty="0" smtClean="0"/>
+                  <a:t>The 1D version is implemented using  Cooley-</a:t>
+                </a:r>
+                <a:r>
+                  <a:rPr lang="en-US" dirty="0" err="1" smtClean="0"/>
+                  <a:t>Tukey</a:t>
+                </a:r>
+                <a:r>
+                  <a:rPr lang="en-US" dirty="0" smtClean="0"/>
+                  <a:t> 2-radix algorithm in </a:t>
+                </a:r>
+                <a14:m>
+                  <m:oMath xmlns:m="http://schemas.openxmlformats.org/officeDocument/2006/math">
+                    <m:r>
+                      <a:rPr lang="en-US" b="0" i="1" smtClean="0">
+                        <a:latin typeface="Cambria Math" panose="02040503050406030204" pitchFamily="18" charset="0"/>
+                      </a:rPr>
+                      <m:t>𝑁𝑙𝑜</m:t>
+                    </m:r>
+                    <m:sSub>
+                      <m:sSubPr>
+                        <m:ctrlPr>
+                          <a:rPr lang="en-US" b="0" i="1" smtClean="0">
+                            <a:latin typeface="Cambria Math" panose="02040503050406030204" pitchFamily="18" charset="0"/>
+                          </a:rPr>
+                        </m:ctrlPr>
+                      </m:sSubPr>
+                      <m:e>
+                        <m:r>
+                          <a:rPr lang="en-US" b="0" i="1" smtClean="0">
+                            <a:latin typeface="Cambria Math" panose="02040503050406030204" pitchFamily="18" charset="0"/>
+                          </a:rPr>
+                          <m:t>𝑔</m:t>
+                        </m:r>
+                      </m:e>
+                      <m:sub>
+                        <m:r>
+                          <a:rPr lang="en-US" b="0" i="1" smtClean="0">
+                            <a:latin typeface="Cambria Math" panose="02040503050406030204" pitchFamily="18" charset="0"/>
+                          </a:rPr>
+                          <m:t>2</m:t>
+                        </m:r>
+                      </m:sub>
+                    </m:sSub>
+                    <m:r>
+                      <a:rPr lang="en-US" b="0" i="1" smtClean="0">
+                        <a:latin typeface="Cambria Math" panose="02040503050406030204" pitchFamily="18" charset="0"/>
+                      </a:rPr>
+                      <m:t>𝑁</m:t>
+                    </m:r>
+                  </m:oMath>
+                </a14:m>
+                <a:r>
+                  <a:rPr lang="en-US" dirty="0" smtClean="0"/>
+                  <a:t> time.</a:t>
+                </a:r>
+              </a:p>
+              <a:p>
+                <a:endParaRPr lang="en-US" dirty="0"/>
+              </a:p>
+              <a:p>
+                <a:r>
+                  <a:rPr lang="en-US" dirty="0" smtClean="0"/>
+                  <a:t>The 2D version simply runs the 1D algorithm on each column and then on each row of the matrix, resulting in </a:t>
+                </a:r>
+                <a14:m>
+                  <m:oMath xmlns:m="http://schemas.openxmlformats.org/officeDocument/2006/math">
+                    <m:r>
+                      <a:rPr lang="en-US" b="0" i="1" smtClean="0">
+                        <a:latin typeface="Cambria Math" panose="02040503050406030204" pitchFamily="18" charset="0"/>
+                      </a:rPr>
+                      <m:t>𝑀𝑙𝑜</m:t>
+                    </m:r>
+                    <m:sSub>
+                      <m:sSubPr>
+                        <m:ctrlPr>
+                          <a:rPr lang="en-US" b="0" i="1" smtClean="0">
+                            <a:latin typeface="Cambria Math" panose="02040503050406030204" pitchFamily="18" charset="0"/>
+                          </a:rPr>
+                        </m:ctrlPr>
+                      </m:sSubPr>
+                      <m:e>
+                        <m:r>
+                          <a:rPr lang="en-US" b="0" i="1" smtClean="0">
+                            <a:latin typeface="Cambria Math" panose="02040503050406030204" pitchFamily="18" charset="0"/>
+                          </a:rPr>
+                          <m:t>𝑔</m:t>
+                        </m:r>
+                      </m:e>
+                      <m:sub>
+                        <m:r>
+                          <a:rPr lang="en-US" b="0" i="1" smtClean="0">
+                            <a:latin typeface="Cambria Math" panose="02040503050406030204" pitchFamily="18" charset="0"/>
+                          </a:rPr>
+                          <m:t>2</m:t>
+                        </m:r>
+                      </m:sub>
+                    </m:sSub>
+                    <m:r>
+                      <a:rPr lang="en-US" b="0" i="1" smtClean="0">
+                        <a:latin typeface="Cambria Math" panose="02040503050406030204" pitchFamily="18" charset="0"/>
+                      </a:rPr>
+                      <m:t>𝑁</m:t>
+                    </m:r>
+                  </m:oMath>
+                </a14:m>
+                <a:r>
+                  <a:rPr lang="en-US" dirty="0" smtClean="0"/>
+                  <a:t>, where M = N*N, the total number of elements.</a:t>
+                </a:r>
+              </a:p>
+              <a:p>
+                <a:endParaRPr lang="en-US" dirty="0"/>
+              </a:p>
+              <a:p>
+                <a:r>
+                  <a:rPr lang="en-US" dirty="0" smtClean="0"/>
+                  <a:t>We end up with 2D complex matrix with the frequency representation of the image.</a:t>
+                </a:r>
+              </a:p>
+            </p:txBody>
+          </p:sp>
+        </mc:Choice>
+        <mc:Fallback>
+          <p:sp>
+            <p:nvSpPr>
+              <p:cNvPr id="3" name="Content Placeholder 2"/>
+              <p:cNvSpPr>
+                <a:spLocks noGrp="1" noRot="1" noChangeAspect="1" noMove="1" noResize="1" noEditPoints="1" noAdjustHandles="1" noChangeArrowheads="1" noChangeShapeType="1" noTextEdit="1"/>
+              </p:cNvSpPr>
+              <p:nvPr>
+                <p:ph idx="1"/>
+              </p:nvPr>
+            </p:nvSpPr>
+            <p:spPr>
+              <a:xfrm>
+                <a:off x="1202919" y="2011679"/>
+                <a:ext cx="4757934" cy="4708297"/>
+              </a:xfrm>
+              <a:blipFill rotWithShape="0">
+                <a:blip r:embed="rId2"/>
+                <a:stretch>
+                  <a:fillRect l="-1408" t="-2202" r="-1793"/>
+                </a:stretch>
+              </a:blipFill>
+            </p:spPr>
+            <p:txBody>
+              <a:bodyPr/>
+              <a:lstStyle/>
+              <a:p>
+                <a:r>
+                  <a:rPr lang="en-US">
+                    <a:noFill/>
+                  </a:rPr>
+                  <a:t> </a:t>
+                </a:r>
+              </a:p>
+            </p:txBody>
+          </p:sp>
+        </mc:Fallback>
+      </mc:AlternateContent>
+      <p:pic>
+        <p:nvPicPr>
+          <p:cNvPr id="4" name="Picture 3"/>
+          <p:cNvPicPr>
+            <a:picLocks noChangeAspect="1"/>
+          </p:cNvPicPr>
+          <p:nvPr/>
+        </p:nvPicPr>
+        <p:blipFill>
+          <a:blip r:embed="rId3"/>
+          <a:stretch>
+            <a:fillRect/>
+          </a:stretch>
+        </p:blipFill>
+        <p:spPr>
+          <a:xfrm>
+            <a:off x="6025101" y="2011680"/>
+            <a:ext cx="5800725" cy="3943350"/>
+          </a:xfrm>
+          <a:prstGeom prst="rect">
+            <a:avLst/>
+          </a:prstGeom>
+        </p:spPr>
+      </p:pic>
+    </p:spTree>
+    <p:extLst>
+      <p:ext uri="{BB962C8B-B14F-4D97-AF65-F5344CB8AC3E}">
+        <p14:creationId xmlns:p14="http://schemas.microsoft.com/office/powerpoint/2010/main" val="1177206826"/>
+      </p:ext>
+    </p:extLst>
+  </p:cSld>
+  <p:clrMapOvr>
+    <a:masterClrMapping/>
+  </p:clrMapOvr>
+</p:sld>
+</file>
+
+<file path=ppt/slides/slide5.xml><?xml version="1.0" encoding="utf-8"?>
+<p:sld xmlns:a="http://schemas.openxmlformats.org/drawingml/2006/main" xmlns:r="http://schemas.openxmlformats.org/officeDocument/2006/relationships" xmlns:p="http://schemas.openxmlformats.org/presentationml/2006/main">
+  <p:cSld>
+    <p:spTree>
+      <p:nvGrpSpPr>
+        <p:cNvPr id="1" name=""/>
+        <p:cNvGrpSpPr/>
+        <p:nvPr/>
+      </p:nvGrpSpPr>
+      <p:grpSpPr>
+        <a:xfrm>
+          <a:off x="0" y="0"/>
+          <a:ext cx="0" cy="0"/>
+          <a:chOff x="0" y="0"/>
+          <a:chExt cx="0" cy="0"/>
+        </a:xfrm>
+      </p:grpSpPr>
+      <p:sp>
+        <p:nvSpPr>
+          <p:cNvPr id="2" name="Title 1"/>
+          <p:cNvSpPr>
+            <a:spLocks noGrp="1"/>
+          </p:cNvSpPr>
+          <p:nvPr>
+            <p:ph type="title"/>
+          </p:nvPr>
+        </p:nvSpPr>
+        <p:spPr/>
+        <p:txBody>
+          <a:bodyPr/>
+          <a:lstStyle/>
+          <a:p>
+            <a:r>
               <a:rPr lang="en-CA" dirty="0" smtClean="0"/>
               <a:t>Results - FFT</a:t>
             </a:r>
@@ -6173,7 +6489,7 @@
 </p:sld>
 </file>
 
-<file path=ppt/slides/slide5.xml><?xml version="1.0" encoding="utf-8"?>
+<file path=ppt/slides/slide6.xml><?xml version="1.0" encoding="utf-8"?>
 <p:sld xmlns:a="http://schemas.openxmlformats.org/drawingml/2006/main" xmlns:r="http://schemas.openxmlformats.org/officeDocument/2006/relationships" xmlns:p="http://schemas.openxmlformats.org/presentationml/2006/main">
   <p:cSld>
     <p:spTree>
@@ -6461,7 +6777,7 @@
 </p:sld>
 </file>
 
-<file path=ppt/slides/slide6.xml><?xml version="1.0" encoding="utf-8"?>
+<file path=ppt/slides/slide7.xml><?xml version="1.0" encoding="utf-8"?>
 <p:sld xmlns:a="http://schemas.openxmlformats.org/drawingml/2006/main" xmlns:r="http://schemas.openxmlformats.org/officeDocument/2006/relationships" xmlns:p="http://schemas.openxmlformats.org/presentationml/2006/main">
   <p:cSld>
     <p:spTree>
@@ -6761,7 +7077,7 @@
 </p:sld>
 </file>
 
-<file path=ppt/slides/slide7.xml><?xml version="1.0" encoding="utf-8"?>
+<file path=ppt/slides/slide8.xml><?xml version="1.0" encoding="utf-8"?>
 <p:sld xmlns:a="http://schemas.openxmlformats.org/drawingml/2006/main" xmlns:r="http://schemas.openxmlformats.org/officeDocument/2006/relationships" xmlns:p="http://schemas.openxmlformats.org/presentationml/2006/main">
   <p:cSld>
     <p:spTree>
@@ -7245,91 +7561,6 @@
 </p:sld>
 </file>
 
-<file path=ppt/slides/slide8.xml><?xml version="1.0" encoding="utf-8"?>
-<p:sld xmlns:a="http://schemas.openxmlformats.org/drawingml/2006/main" xmlns:r="http://schemas.openxmlformats.org/officeDocument/2006/relationships" xmlns:p="http://schemas.openxmlformats.org/presentationml/2006/main">
-  <p:cSld>
-    <p:spTree>
-      <p:nvGrpSpPr>
-        <p:cNvPr id="1" name=""/>
-        <p:cNvGrpSpPr/>
-        <p:nvPr/>
-      </p:nvGrpSpPr>
-      <p:grpSpPr>
-        <a:xfrm>
-          <a:off x="0" y="0"/>
-          <a:ext cx="0" cy="0"/>
-          <a:chOff x="0" y="0"/>
-          <a:chExt cx="0" cy="0"/>
-        </a:xfrm>
-      </p:grpSpPr>
-      <p:sp>
-        <p:nvSpPr>
-          <p:cNvPr id="2" name="Title 1"/>
-          <p:cNvSpPr>
-            <a:spLocks noGrp="1"/>
-          </p:cNvSpPr>
-          <p:nvPr>
-            <p:ph type="title"/>
-          </p:nvPr>
-        </p:nvSpPr>
-        <p:spPr/>
-        <p:txBody>
-          <a:bodyPr/>
-          <a:lstStyle/>
-          <a:p>
-            <a:r>
-              <a:rPr lang="en-US" dirty="0" smtClean="0"/>
-              <a:t>Results – Hashing – I7 Processor</a:t>
-            </a:r>
-            <a:endParaRPr lang="en-US" dirty="0"/>
-          </a:p>
-        </p:txBody>
-      </p:sp>
-      <p:graphicFrame>
-        <p:nvGraphicFramePr>
-          <p:cNvPr id="16" name="Content Placeholder 15"/>
-          <p:cNvGraphicFramePr>
-            <a:graphicFrameLocks noGrp="1"/>
-          </p:cNvGraphicFramePr>
-          <p:nvPr>
-            <p:ph idx="1"/>
-            <p:extLst>
-              <p:ext uri="{D42A27DB-BD31-4B8C-83A1-F6EECF244321}">
-                <p14:modId xmlns:p14="http://schemas.microsoft.com/office/powerpoint/2010/main" val="2709095916"/>
-              </p:ext>
-            </p:extLst>
-          </p:nvPr>
-        </p:nvGraphicFramePr>
-        <p:xfrm>
-          <a:off x="1203325" y="2011363"/>
-          <a:ext cx="9783763" cy="4206875"/>
-        </p:xfrm>
-        <a:graphic>
-          <a:graphicData uri="http://schemas.openxmlformats.org/drawingml/2006/chart">
-            <c:chart xmlns:c="http://schemas.openxmlformats.org/drawingml/2006/chart" xmlns:r="http://schemas.openxmlformats.org/officeDocument/2006/relationships" r:id="rId2"/>
-          </a:graphicData>
-        </a:graphic>
-      </p:graphicFrame>
-    </p:spTree>
-    <p:extLst>
-      <p:ext uri="{BB962C8B-B14F-4D97-AF65-F5344CB8AC3E}">
-        <p14:creationId xmlns:p14="http://schemas.microsoft.com/office/powerpoint/2010/main" val="187523575"/>
-      </p:ext>
-    </p:extLst>
-  </p:cSld>
-  <p:clrMapOvr>
-    <a:masterClrMapping/>
-  </p:clrMapOvr>
-  <p:timing>
-    <p:tnLst>
-      <p:par>
-        <p:cTn id="1" dur="indefinite" restart="never" nodeType="tmRoot"/>
-      </p:par>
-    </p:tnLst>
-  </p:timing>
-</p:sld>
-</file>
-
 <file path=ppt/slides/slide9.xml><?xml version="1.0" encoding="utf-8"?>
 <p:sld xmlns:a="http://schemas.openxmlformats.org/drawingml/2006/main" xmlns:r="http://schemas.openxmlformats.org/officeDocument/2006/relationships" xmlns:p="http://schemas.openxmlformats.org/presentationml/2006/main">
   <p:cSld>
@@ -7364,81 +7595,41 @@
           <a:p>
             <a:r>
               <a:rPr lang="en-US" dirty="0" smtClean="0"/>
-              <a:t>conclusion</a:t>
+              <a:t>Results – Hashing – I7 Processor</a:t>
             </a:r>
             <a:endParaRPr lang="en-US" dirty="0"/>
           </a:p>
         </p:txBody>
       </p:sp>
-      <p:sp>
-        <p:nvSpPr>
-          <p:cNvPr id="3" name="Content Placeholder 2"/>
-          <p:cNvSpPr>
-            <a:spLocks noGrp="1"/>
-          </p:cNvSpPr>
+      <p:graphicFrame>
+        <p:nvGraphicFramePr>
+          <p:cNvPr id="16" name="Content Placeholder 15"/>
+          <p:cNvGraphicFramePr>
+            <a:graphicFrameLocks noGrp="1"/>
+          </p:cNvGraphicFramePr>
           <p:nvPr>
             <p:ph idx="1"/>
-          </p:nvPr>
-        </p:nvSpPr>
-        <p:spPr/>
-        <p:txBody>
-          <a:bodyPr/>
-          <a:lstStyle/>
-          <a:p>
-            <a:r>
-              <a:rPr lang="en-US" dirty="0" smtClean="0"/>
-              <a:t>An improvement to our algorithm would </a:t>
-            </a:r>
-            <a:r>
-              <a:rPr lang="en-US" dirty="0" smtClean="0"/>
-              <a:t>be to implement </a:t>
-            </a:r>
-            <a:r>
-              <a:rPr lang="en-US" dirty="0" smtClean="0"/>
-              <a:t>the </a:t>
-            </a:r>
-            <a:r>
-              <a:rPr lang="en-US" dirty="0" smtClean="0"/>
-              <a:t>Fisher faces algorithm for </a:t>
-            </a:r>
-            <a:r>
-              <a:rPr lang="en-US" dirty="0" smtClean="0"/>
-              <a:t>facial.</a:t>
-            </a:r>
-            <a:endParaRPr lang="en-US" dirty="0" smtClean="0"/>
-          </a:p>
-          <a:p>
-            <a:endParaRPr lang="en-US" dirty="0"/>
-          </a:p>
-          <a:p>
-            <a:r>
-              <a:rPr lang="en-US" dirty="0" smtClean="0"/>
-              <a:t>It’s more performant to parallelize the FFT process</a:t>
-            </a:r>
-          </a:p>
-          <a:p>
-            <a:endParaRPr lang="en-US" dirty="0"/>
-          </a:p>
-          <a:p>
-            <a:r>
-              <a:rPr lang="en-US" dirty="0" smtClean="0"/>
-              <a:t>Using </a:t>
-            </a:r>
-            <a:r>
-              <a:rPr lang="en-US" dirty="0" err="1" smtClean="0"/>
-              <a:t>OpenMP</a:t>
-            </a:r>
-            <a:r>
-              <a:rPr lang="en-US" dirty="0" smtClean="0"/>
-              <a:t> to parallelize the hashing part is not worth it since the parallelized computations are very simple (multiplication) and the communication overhead is too large.</a:t>
-            </a:r>
-          </a:p>
-        </p:txBody>
-      </p:sp>
+            <p:extLst>
+              <p:ext uri="{D42A27DB-BD31-4B8C-83A1-F6EECF244321}">
+                <p14:modId xmlns:p14="http://schemas.microsoft.com/office/powerpoint/2010/main" val="2709095916"/>
+              </p:ext>
+            </p:extLst>
+          </p:nvPr>
+        </p:nvGraphicFramePr>
+        <p:xfrm>
+          <a:off x="1203325" y="2011363"/>
+          <a:ext cx="9783763" cy="4206875"/>
+        </p:xfrm>
+        <a:graphic>
+          <a:graphicData uri="http://schemas.openxmlformats.org/drawingml/2006/chart">
+            <c:chart xmlns:c="http://schemas.openxmlformats.org/drawingml/2006/chart" xmlns:r="http://schemas.openxmlformats.org/officeDocument/2006/relationships" r:id="rId2"/>
+          </a:graphicData>
+        </a:graphic>
+      </p:graphicFrame>
     </p:spTree>
     <p:extLst>
       <p:ext uri="{BB962C8B-B14F-4D97-AF65-F5344CB8AC3E}">
-        <p14:creationId xmlns:p14="http://schemas.microsoft.com/office/powerpoint/2010/main" val="847783788"/>
+        <p14:creationId xmlns:p14="http://schemas.microsoft.com/office/powerpoint/2010/main" val="187523575"/>
       </p:ext>
     </p:extLst>
   </p:cSld>

</xml_diff>

<commit_message>
addes fft opencl slide
</commit_message>
<xml_diff>
--- a/results/presentation_draft.pptx
+++ b/results/presentation_draft.pptx
@@ -9,12 +9,13 @@
     <p:sldId id="257" r:id="rId3"/>
     <p:sldId id="259" r:id="rId4"/>
     <p:sldId id="265" r:id="rId5"/>
-    <p:sldId id="264" r:id="rId6"/>
-    <p:sldId id="260" r:id="rId7"/>
-    <p:sldId id="263" r:id="rId8"/>
-    <p:sldId id="258" r:id="rId9"/>
-    <p:sldId id="261" r:id="rId10"/>
-    <p:sldId id="262" r:id="rId11"/>
+    <p:sldId id="266" r:id="rId6"/>
+    <p:sldId id="264" r:id="rId7"/>
+    <p:sldId id="260" r:id="rId8"/>
+    <p:sldId id="263" r:id="rId9"/>
+    <p:sldId id="258" r:id="rId10"/>
+    <p:sldId id="261" r:id="rId11"/>
+    <p:sldId id="262" r:id="rId12"/>
   </p:sldIdLst>
   <p:sldSz cx="12192000" cy="6858000"/>
   <p:notesSz cx="6858000" cy="9144000"/>
@@ -472,11 +473,11 @@
         </c:dLbls>
         <c:gapWidth val="219"/>
         <c:overlap val="-27"/>
-        <c:axId val="-1961258016"/>
-        <c:axId val="-1961252576"/>
+        <c:axId val="352180760"/>
+        <c:axId val="352175272"/>
       </c:barChart>
       <c:catAx>
-        <c:axId val="-1961258016"/>
+        <c:axId val="352180760"/>
         <c:scaling>
           <c:orientation val="minMax"/>
         </c:scaling>
@@ -519,7 +520,7 @@
             <a:endParaRPr lang="en-US"/>
           </a:p>
         </c:txPr>
-        <c:crossAx val="-1961252576"/>
+        <c:crossAx val="352175272"/>
         <c:crosses val="autoZero"/>
         <c:auto val="1"/>
         <c:lblAlgn val="ctr"/>
@@ -527,7 +528,7 @@
         <c:noMultiLvlLbl val="0"/>
       </c:catAx>
       <c:valAx>
-        <c:axId val="-1961252576"/>
+        <c:axId val="352175272"/>
         <c:scaling>
           <c:orientation val="minMax"/>
         </c:scaling>
@@ -578,7 +579,7 @@
             <a:endParaRPr lang="en-US"/>
           </a:p>
         </c:txPr>
-        <c:crossAx val="-1961258016"/>
+        <c:crossAx val="352180760"/>
         <c:crosses val="autoZero"/>
         <c:crossBetween val="between"/>
       </c:valAx>
@@ -689,7 +690,6 @@
           </a:p>
         </c:rich>
       </c:tx>
-      <c:layout/>
       <c:overlay val="0"/>
       <c:spPr>
         <a:noFill/>
@@ -1071,11 +1071,11 @@
         </c:dLbls>
         <c:gapWidth val="219"/>
         <c:overlap val="-27"/>
-        <c:axId val="-1961262368"/>
-        <c:axId val="-1961260736"/>
+        <c:axId val="297463392"/>
+        <c:axId val="297467704"/>
       </c:barChart>
       <c:catAx>
-        <c:axId val="-1961262368"/>
+        <c:axId val="297463392"/>
         <c:scaling>
           <c:orientation val="minMax"/>
         </c:scaling>
@@ -1118,7 +1118,7 @@
             <a:endParaRPr lang="en-US"/>
           </a:p>
         </c:txPr>
-        <c:crossAx val="-1961260736"/>
+        <c:crossAx val="297467704"/>
         <c:crosses val="autoZero"/>
         <c:auto val="1"/>
         <c:lblAlgn val="ctr"/>
@@ -1126,7 +1126,7 @@
         <c:noMultiLvlLbl val="0"/>
       </c:catAx>
       <c:valAx>
-        <c:axId val="-1961260736"/>
+        <c:axId val="297467704"/>
         <c:scaling>
           <c:orientation val="minMax"/>
         </c:scaling>
@@ -1177,7 +1177,7 @@
             <a:endParaRPr lang="en-US"/>
           </a:p>
         </c:txPr>
-        <c:crossAx val="-1961262368"/>
+        <c:crossAx val="297463392"/>
         <c:crosses val="autoZero"/>
         <c:crossBetween val="between"/>
       </c:valAx>
@@ -1191,7 +1191,6 @@
     </c:plotArea>
     <c:legend>
       <c:legendPos val="b"/>
-      <c:layout/>
       <c:overlay val="0"/>
       <c:spPr>
         <a:noFill/>
@@ -5721,6 +5720,91 @@
           <a:p>
             <a:r>
               <a:rPr lang="en-US" dirty="0" smtClean="0"/>
+              <a:t>Results – Hashing – I7 Processor</a:t>
+            </a:r>
+            <a:endParaRPr lang="en-US" dirty="0"/>
+          </a:p>
+        </p:txBody>
+      </p:sp>
+      <p:graphicFrame>
+        <p:nvGraphicFramePr>
+          <p:cNvPr id="16" name="Content Placeholder 15"/>
+          <p:cNvGraphicFramePr>
+            <a:graphicFrameLocks noGrp="1"/>
+          </p:cNvGraphicFramePr>
+          <p:nvPr>
+            <p:ph idx="1"/>
+            <p:extLst>
+              <p:ext uri="{D42A27DB-BD31-4B8C-83A1-F6EECF244321}">
+                <p14:modId xmlns:p14="http://schemas.microsoft.com/office/powerpoint/2010/main" val="2709095916"/>
+              </p:ext>
+            </p:extLst>
+          </p:nvPr>
+        </p:nvGraphicFramePr>
+        <p:xfrm>
+          <a:off x="1203325" y="2011363"/>
+          <a:ext cx="9783763" cy="4206875"/>
+        </p:xfrm>
+        <a:graphic>
+          <a:graphicData uri="http://schemas.openxmlformats.org/drawingml/2006/chart">
+            <c:chart xmlns:c="http://schemas.openxmlformats.org/drawingml/2006/chart" xmlns:r="http://schemas.openxmlformats.org/officeDocument/2006/relationships" r:id="rId2"/>
+          </a:graphicData>
+        </a:graphic>
+      </p:graphicFrame>
+    </p:spTree>
+    <p:extLst>
+      <p:ext uri="{BB962C8B-B14F-4D97-AF65-F5344CB8AC3E}">
+        <p14:creationId xmlns:p14="http://schemas.microsoft.com/office/powerpoint/2010/main" val="187523575"/>
+      </p:ext>
+    </p:extLst>
+  </p:cSld>
+  <p:clrMapOvr>
+    <a:masterClrMapping/>
+  </p:clrMapOvr>
+  <p:timing>
+    <p:tnLst>
+      <p:par>
+        <p:cTn id="1" dur="indefinite" restart="never" nodeType="tmRoot"/>
+      </p:par>
+    </p:tnLst>
+  </p:timing>
+</p:sld>
+</file>
+
+<file path=ppt/slides/slide11.xml><?xml version="1.0" encoding="utf-8"?>
+<p:sld xmlns:a="http://schemas.openxmlformats.org/drawingml/2006/main" xmlns:r="http://schemas.openxmlformats.org/officeDocument/2006/relationships" xmlns:p="http://schemas.openxmlformats.org/presentationml/2006/main">
+  <p:cSld>
+    <p:spTree>
+      <p:nvGrpSpPr>
+        <p:cNvPr id="1" name=""/>
+        <p:cNvGrpSpPr/>
+        <p:nvPr/>
+      </p:nvGrpSpPr>
+      <p:grpSpPr>
+        <a:xfrm>
+          <a:off x="0" y="0"/>
+          <a:ext cx="0" cy="0"/>
+          <a:chOff x="0" y="0"/>
+          <a:chExt cx="0" cy="0"/>
+        </a:xfrm>
+      </p:grpSpPr>
+      <p:sp>
+        <p:nvSpPr>
+          <p:cNvPr id="2" name="Title 1"/>
+          <p:cNvSpPr>
+            <a:spLocks noGrp="1"/>
+          </p:cNvSpPr>
+          <p:nvPr>
+            <p:ph type="title"/>
+          </p:nvPr>
+        </p:nvSpPr>
+        <p:spPr/>
+        <p:txBody>
+          <a:bodyPr/>
+          <a:lstStyle/>
+          <a:p>
+            <a:r>
+              <a:rPr lang="en-US" dirty="0" smtClean="0"/>
               <a:t>conclusion</a:t>
             </a:r>
             <a:endParaRPr lang="en-US" dirty="0"/>
@@ -6188,8 +6272,8 @@
           </a:p>
         </p:txBody>
       </p:sp>
-      <mc:AlternateContent xmlns:mc="http://schemas.openxmlformats.org/markup-compatibility/2006">
-        <mc:Choice xmlns:a14="http://schemas.microsoft.com/office/drawing/2010/main" Requires="a14">
+      <mc:AlternateContent xmlns:mc="http://schemas.openxmlformats.org/markup-compatibility/2006" xmlns:a14="http://schemas.microsoft.com/office/drawing/2010/main">
+        <mc:Choice Requires="a14">
           <p:sp>
             <p:nvSpPr>
               <p:cNvPr id="3" name="Content Placeholder 2"/>
@@ -6336,7 +6420,7 @@
             </p:txBody>
           </p:sp>
         </mc:Choice>
-        <mc:Fallback>
+        <mc:Fallback xmlns="">
           <p:sp>
             <p:nvSpPr>
               <p:cNvPr id="3" name="Content Placeholder 2"/>
@@ -6444,6 +6528,142 @@
           <a:lstStyle/>
           <a:p>
             <a:r>
+              <a:rPr lang="en-US" dirty="0" smtClean="0"/>
+              <a:t>FFT on the </a:t>
+            </a:r>
+            <a:r>
+              <a:rPr lang="en-US" dirty="0" err="1" smtClean="0"/>
+              <a:t>gpu</a:t>
+            </a:r>
+            <a:r>
+              <a:rPr lang="en-US" dirty="0" smtClean="0"/>
+              <a:t> using </a:t>
+            </a:r>
+            <a:r>
+              <a:rPr lang="en-US" dirty="0" err="1" smtClean="0"/>
+              <a:t>opencl</a:t>
+            </a:r>
+            <a:endParaRPr lang="en-US" dirty="0"/>
+          </a:p>
+        </p:txBody>
+      </p:sp>
+      <p:sp>
+        <p:nvSpPr>
+          <p:cNvPr id="3" name="Content Placeholder 2"/>
+          <p:cNvSpPr>
+            <a:spLocks noGrp="1"/>
+          </p:cNvSpPr>
+          <p:nvPr>
+            <p:ph idx="1"/>
+          </p:nvPr>
+        </p:nvSpPr>
+        <p:spPr/>
+        <p:txBody>
+          <a:bodyPr/>
+          <a:lstStyle/>
+          <a:p>
+            <a:r>
+              <a:rPr lang="en-US" dirty="0" smtClean="0"/>
+              <a:t>FFT operation is a great fit to un on GPUs:</a:t>
+            </a:r>
+          </a:p>
+          <a:p>
+            <a:pPr lvl="2"/>
+            <a:endParaRPr lang="en-US" dirty="0" smtClean="0"/>
+          </a:p>
+          <a:p>
+            <a:pPr lvl="2"/>
+            <a:r>
+              <a:rPr lang="en-US" sz="2200" dirty="0" smtClean="0"/>
+              <a:t>By linearity of the Fourier transform operation, data can be computed independently and coalesced later.</a:t>
+            </a:r>
+          </a:p>
+          <a:p>
+            <a:pPr lvl="2"/>
+            <a:endParaRPr lang="en-US" sz="2200" dirty="0"/>
+          </a:p>
+          <a:p>
+            <a:pPr lvl="2"/>
+            <a:r>
+              <a:rPr lang="en-US" sz="2200" dirty="0" smtClean="0"/>
+              <a:t>Our algorithm computes the 1D FFT on each row of the image. Each computation can be done independently.</a:t>
+            </a:r>
+          </a:p>
+          <a:p>
+            <a:pPr lvl="2"/>
+            <a:endParaRPr lang="en-US" sz="2200" dirty="0"/>
+          </a:p>
+          <a:p>
+            <a:pPr lvl="2"/>
+            <a:r>
+              <a:rPr lang="en-US" sz="2200" dirty="0" smtClean="0"/>
+              <a:t>Simple arithmetic operations, which the GPUs are built to crunch.</a:t>
+            </a:r>
+          </a:p>
+          <a:p>
+            <a:pPr lvl="2"/>
+            <a:endParaRPr lang="en-US" dirty="0"/>
+          </a:p>
+          <a:p>
+            <a:pPr lvl="2"/>
+            <a:endParaRPr lang="en-US" dirty="0" smtClean="0"/>
+          </a:p>
+          <a:p>
+            <a:pPr lvl="2"/>
+            <a:endParaRPr lang="en-US" dirty="0"/>
+          </a:p>
+          <a:p>
+            <a:pPr lvl="2"/>
+            <a:endParaRPr lang="en-US" dirty="0" smtClean="0"/>
+          </a:p>
+        </p:txBody>
+      </p:sp>
+    </p:spTree>
+    <p:extLst>
+      <p:ext uri="{BB962C8B-B14F-4D97-AF65-F5344CB8AC3E}">
+        <p14:creationId xmlns:p14="http://schemas.microsoft.com/office/powerpoint/2010/main" val="2108681048"/>
+      </p:ext>
+    </p:extLst>
+  </p:cSld>
+  <p:clrMapOvr>
+    <a:masterClrMapping/>
+  </p:clrMapOvr>
+</p:sld>
+</file>
+
+<file path=ppt/slides/slide6.xml><?xml version="1.0" encoding="utf-8"?>
+<p:sld xmlns:a="http://schemas.openxmlformats.org/drawingml/2006/main" xmlns:r="http://schemas.openxmlformats.org/officeDocument/2006/relationships" xmlns:p="http://schemas.openxmlformats.org/presentationml/2006/main">
+  <p:cSld>
+    <p:spTree>
+      <p:nvGrpSpPr>
+        <p:cNvPr id="1" name=""/>
+        <p:cNvGrpSpPr/>
+        <p:nvPr/>
+      </p:nvGrpSpPr>
+      <p:grpSpPr>
+        <a:xfrm>
+          <a:off x="0" y="0"/>
+          <a:ext cx="0" cy="0"/>
+          <a:chOff x="0" y="0"/>
+          <a:chExt cx="0" cy="0"/>
+        </a:xfrm>
+      </p:grpSpPr>
+      <p:sp>
+        <p:nvSpPr>
+          <p:cNvPr id="2" name="Title 1"/>
+          <p:cNvSpPr>
+            <a:spLocks noGrp="1"/>
+          </p:cNvSpPr>
+          <p:nvPr>
+            <p:ph type="title"/>
+          </p:nvPr>
+        </p:nvSpPr>
+        <p:spPr/>
+        <p:txBody>
+          <a:bodyPr/>
+          <a:lstStyle/>
+          <a:p>
+            <a:r>
               <a:rPr lang="en-CA" dirty="0" smtClean="0"/>
               <a:t>Results - FFT</a:t>
             </a:r>
@@ -6489,7 +6709,7 @@
 </p:sld>
 </file>
 
-<file path=ppt/slides/slide6.xml><?xml version="1.0" encoding="utf-8"?>
+<file path=ppt/slides/slide7.xml><?xml version="1.0" encoding="utf-8"?>
 <p:sld xmlns:a="http://schemas.openxmlformats.org/drawingml/2006/main" xmlns:r="http://schemas.openxmlformats.org/officeDocument/2006/relationships" xmlns:p="http://schemas.openxmlformats.org/presentationml/2006/main">
   <p:cSld>
     <p:spTree>
@@ -6777,7 +6997,7 @@
 </p:sld>
 </file>
 
-<file path=ppt/slides/slide7.xml><?xml version="1.0" encoding="utf-8"?>
+<file path=ppt/slides/slide8.xml><?xml version="1.0" encoding="utf-8"?>
 <p:sld xmlns:a="http://schemas.openxmlformats.org/drawingml/2006/main" xmlns:r="http://schemas.openxmlformats.org/officeDocument/2006/relationships" xmlns:p="http://schemas.openxmlformats.org/presentationml/2006/main">
   <p:cSld>
     <p:spTree>
@@ -7077,7 +7297,7 @@
 </p:sld>
 </file>
 
-<file path=ppt/slides/slide8.xml><?xml version="1.0" encoding="utf-8"?>
+<file path=ppt/slides/slide9.xml><?xml version="1.0" encoding="utf-8"?>
 <p:sld xmlns:a="http://schemas.openxmlformats.org/drawingml/2006/main" xmlns:r="http://schemas.openxmlformats.org/officeDocument/2006/relationships" xmlns:p="http://schemas.openxmlformats.org/presentationml/2006/main">
   <p:cSld>
     <p:spTree>
@@ -7561,91 +7781,6 @@
 </p:sld>
 </file>
 
-<file path=ppt/slides/slide9.xml><?xml version="1.0" encoding="utf-8"?>
-<p:sld xmlns:a="http://schemas.openxmlformats.org/drawingml/2006/main" xmlns:r="http://schemas.openxmlformats.org/officeDocument/2006/relationships" xmlns:p="http://schemas.openxmlformats.org/presentationml/2006/main">
-  <p:cSld>
-    <p:spTree>
-      <p:nvGrpSpPr>
-        <p:cNvPr id="1" name=""/>
-        <p:cNvGrpSpPr/>
-        <p:nvPr/>
-      </p:nvGrpSpPr>
-      <p:grpSpPr>
-        <a:xfrm>
-          <a:off x="0" y="0"/>
-          <a:ext cx="0" cy="0"/>
-          <a:chOff x="0" y="0"/>
-          <a:chExt cx="0" cy="0"/>
-        </a:xfrm>
-      </p:grpSpPr>
-      <p:sp>
-        <p:nvSpPr>
-          <p:cNvPr id="2" name="Title 1"/>
-          <p:cNvSpPr>
-            <a:spLocks noGrp="1"/>
-          </p:cNvSpPr>
-          <p:nvPr>
-            <p:ph type="title"/>
-          </p:nvPr>
-        </p:nvSpPr>
-        <p:spPr/>
-        <p:txBody>
-          <a:bodyPr/>
-          <a:lstStyle/>
-          <a:p>
-            <a:r>
-              <a:rPr lang="en-US" dirty="0" smtClean="0"/>
-              <a:t>Results – Hashing – I7 Processor</a:t>
-            </a:r>
-            <a:endParaRPr lang="en-US" dirty="0"/>
-          </a:p>
-        </p:txBody>
-      </p:sp>
-      <p:graphicFrame>
-        <p:nvGraphicFramePr>
-          <p:cNvPr id="16" name="Content Placeholder 15"/>
-          <p:cNvGraphicFramePr>
-            <a:graphicFrameLocks noGrp="1"/>
-          </p:cNvGraphicFramePr>
-          <p:nvPr>
-            <p:ph idx="1"/>
-            <p:extLst>
-              <p:ext uri="{D42A27DB-BD31-4B8C-83A1-F6EECF244321}">
-                <p14:modId xmlns:p14="http://schemas.microsoft.com/office/powerpoint/2010/main" val="2709095916"/>
-              </p:ext>
-            </p:extLst>
-          </p:nvPr>
-        </p:nvGraphicFramePr>
-        <p:xfrm>
-          <a:off x="1203325" y="2011363"/>
-          <a:ext cx="9783763" cy="4206875"/>
-        </p:xfrm>
-        <a:graphic>
-          <a:graphicData uri="http://schemas.openxmlformats.org/drawingml/2006/chart">
-            <c:chart xmlns:c="http://schemas.openxmlformats.org/drawingml/2006/chart" xmlns:r="http://schemas.openxmlformats.org/officeDocument/2006/relationships" r:id="rId2"/>
-          </a:graphicData>
-        </a:graphic>
-      </p:graphicFrame>
-    </p:spTree>
-    <p:extLst>
-      <p:ext uri="{BB962C8B-B14F-4D97-AF65-F5344CB8AC3E}">
-        <p14:creationId xmlns:p14="http://schemas.microsoft.com/office/powerpoint/2010/main" val="187523575"/>
-      </p:ext>
-    </p:extLst>
-  </p:cSld>
-  <p:clrMapOvr>
-    <a:masterClrMapping/>
-  </p:clrMapOvr>
-  <p:timing>
-    <p:tnLst>
-      <p:par>
-        <p:cTn id="1" dur="indefinite" restart="never" nodeType="tmRoot"/>
-      </p:par>
-    </p:tnLst>
-  </p:timing>
-</p:sld>
-</file>
-
 <file path=ppt/theme/theme1.xml><?xml version="1.0" encoding="utf-8"?>
 <a:theme xmlns:a="http://schemas.openxmlformats.org/drawingml/2006/main" name="Banded">
   <a:themeElements>

</xml_diff>